<commit_message>
Change from bulleted to numbered steps in PSIP process
</commit_message>
<xml_diff>
--- a/presentations/summary.pptx
+++ b/presentations/summary.pptx
@@ -3929,12 +3929,20 @@
             </a:r>
           </a:p>
           <a:p>
+            <a:pPr marL="457200" indent="-457200">
+              <a:buFont typeface="+mj-lt"/>
+              <a:buAutoNum type="arabicPeriod"/>
+            </a:pPr>
             <a:r>
               <a:rPr lang="en-US" sz="2000" dirty="0"/>
               <a:t>Identify your team’s “pain points” in your software development processes</a:t>
             </a:r>
           </a:p>
           <a:p>
+            <a:pPr marL="457200" indent="-457200">
+              <a:buFont typeface="+mj-lt"/>
+              <a:buAutoNum type="arabicPeriod"/>
+            </a:pPr>
             <a:r>
               <a:rPr lang="en-US" sz="2000" dirty="0"/>
               <a:t>Set a goal for something to improve</a:t>
@@ -3963,6 +3971,10 @@
             </a:r>
           </a:p>
           <a:p>
+            <a:pPr marL="457200" indent="-457200">
+              <a:buFont typeface="+mj-lt"/>
+              <a:buAutoNum type="arabicPeriod"/>
+            </a:pPr>
             <a:r>
               <a:rPr lang="en-US" sz="2000" dirty="0"/>
               <a:t>Agree on a plan to address it, identify markers of progress and what is “done”</a:t>
@@ -3980,18 +3992,29 @@
             </a:r>
           </a:p>
           <a:p>
+            <a:pPr marL="457200" indent="-457200">
+              <a:buFont typeface="+mj-lt"/>
+              <a:buAutoNum type="arabicPeriod"/>
+            </a:pPr>
             <a:r>
               <a:rPr lang="en-US" sz="2000" dirty="0"/>
               <a:t>Work your plan, track your progress</a:t>
             </a:r>
           </a:p>
           <a:p>
+            <a:pPr marL="457200" indent="-457200">
+              <a:buFont typeface="+mj-lt"/>
+              <a:buAutoNum type="arabicPeriod"/>
+            </a:pPr>
             <a:r>
               <a:rPr lang="en-US" sz="2000" dirty="0"/>
               <a:t>When you are done, celebrate…</a:t>
             </a:r>
           </a:p>
           <a:p>
+            <a:pPr marL="0" indent="0">
+              <a:buNone/>
+            </a:pPr>
             <a:r>
               <a:rPr lang="en-US" sz="2000" dirty="0"/>
               <a:t>…then pick a new pain point to address</a:t>
@@ -7983,15 +8006,6 @@
 </file>
 
 <file path=customXml/item2.xml><?xml version="1.0" encoding="utf-8"?>
-<?mso-contentType ?>
-<FormTemplates xmlns="http://schemas.microsoft.com/sharepoint/v3/contenttype/forms">
-  <Display>DocumentLibraryForm</Display>
-  <Edit>DocumentLibraryForm</Edit>
-  <New>DocumentLibraryForm</New>
-</FormTemplates>
-</file>
-
-<file path=customXml/item3.xml><?xml version="1.0" encoding="utf-8"?>
 <ct:contentTypeSchema xmlns:ct="http://schemas.microsoft.com/office/2006/metadata/contentType" xmlns:ma="http://schemas.microsoft.com/office/2006/metadata/properties/metaAttributes" ct:_="" ma:_="" ma:contentTypeName="Document" ma:contentTypeID="0x010100565464437F680748A68B85EB6594EA7D" ma:contentTypeVersion="0" ma:contentTypeDescription="Create a new document." ma:contentTypeScope="" ma:versionID="fe3f4dd58d5914c51cfc6deaa8ad845c">
   <xsd:schema xmlns:xsd="http://www.w3.org/2001/XMLSchema" xmlns:p="http://schemas.microsoft.com/office/2006/metadata/properties" targetNamespace="http://schemas.microsoft.com/office/2006/metadata/properties" ma:root="true" ma:fieldsID="4aeb20c0e3442673af7ee10786458764">
     <xsd:element name="properties">
@@ -8040,6 +8054,15 @@
 </ct:contentTypeSchema>
 </file>
 
+<file path=customXml/item3.xml><?xml version="1.0" encoding="utf-8"?>
+<?mso-contentType ?>
+<FormTemplates xmlns="http://schemas.microsoft.com/sharepoint/v3/contenttype/forms">
+  <Display>DocumentLibraryForm</Display>
+  <Edit>DocumentLibraryForm</Edit>
+  <New>DocumentLibraryForm</New>
+</FormTemplates>
+</file>
+
 <file path=customXml/itemProps1.xml><?xml version="1.0" encoding="utf-8"?>
 <ds:datastoreItem xmlns:ds="http://schemas.openxmlformats.org/officeDocument/2006/customXml" ds:itemID="{A50EC660-24D0-43A0-AE5E-E274115E726B}">
   <ds:schemaRefs>
@@ -8056,14 +8079,6 @@
 </file>
 
 <file path=customXml/itemProps2.xml><?xml version="1.0" encoding="utf-8"?>
-<ds:datastoreItem xmlns:ds="http://schemas.openxmlformats.org/officeDocument/2006/customXml" ds:itemID="{19E20559-B232-4371-8690-E3D8007EDB82}">
-  <ds:schemaRefs>
-    <ds:schemaRef ds:uri="http://schemas.microsoft.com/sharepoint/v3/contenttype/forms"/>
-  </ds:schemaRefs>
-</ds:datastoreItem>
-</file>
-
-<file path=customXml/itemProps3.xml><?xml version="1.0" encoding="utf-8"?>
 <ds:datastoreItem xmlns:ds="http://schemas.openxmlformats.org/officeDocument/2006/customXml" ds:itemID="{E8DB7DEB-074E-4EE8-9B6E-FD277323109C}">
   <ds:schemaRefs>
     <ds:schemaRef ds:uri="http://schemas.microsoft.com/office/2006/metadata/contentType"/>
@@ -8076,4 +8091,12 @@
     <ds:schemaRef ds:uri="http://schemas.microsoft.com/office/internal/2005/internalDocumentation"/>
   </ds:schemaRefs>
 </ds:datastoreItem>
+</file>
+
+<file path=customXml/itemProps3.xml><?xml version="1.0" encoding="utf-8"?>
+<ds:datastoreItem xmlns:ds="http://schemas.openxmlformats.org/officeDocument/2006/customXml" ds:itemID="{19E20559-B232-4371-8690-E3D8007EDB82}">
+  <ds:schemaRefs>
+    <ds:schemaRef ds:uri="http://schemas.microsoft.com/sharepoint/v3/contenttype/forms"/>
+  </ds:schemaRefs>
+</ds:datastoreItem>
 </file>
</xml_diff>